<commit_message>
PPT for SQL Updated
</commit_message>
<xml_diff>
--- a/DA using SQL/PPT/SQL for Data Reporting and Analysis.pptx
+++ b/DA using SQL/PPT/SQL for Data Reporting and Analysis.pptx
@@ -926,7 +926,7 @@
             </a:lnSpc>
           </a:pPr>
           <a:r>
-            <a:rPr lang="en-US"/>
+            <a:rPr lang="en-US" dirty="0"/>
             <a:t>Retrieve data with SELECT</a:t>
           </a:r>
         </a:p>
@@ -1008,7 +1008,7 @@
             </a:lnSpc>
           </a:pPr>
           <a:r>
-            <a:rPr lang="en-US"/>
+            <a:rPr lang="en-US" dirty="0"/>
             <a:t>Use Like, IN, and wildcards with Where.</a:t>
           </a:r>
         </a:p>
@@ -1213,7 +1213,7 @@
             </a:lnSpc>
           </a:pPr>
           <a:r>
-            <a:rPr lang="en-US"/>
+            <a:rPr lang="en-US" dirty="0"/>
             <a:t>Use data functions with Where.</a:t>
           </a:r>
         </a:p>
@@ -1897,7 +1897,7 @@
             <a:buNone/>
           </a:pPr>
           <a:r>
-            <a:rPr lang="en-US" sz="1600" kern="1200"/>
+            <a:rPr lang="en-US" sz="1600" kern="1200" dirty="0"/>
             <a:t>Retrieve data with SELECT</a:t>
           </a:r>
         </a:p>
@@ -2201,7 +2201,7 @@
             <a:buNone/>
           </a:pPr>
           <a:r>
-            <a:rPr lang="en-US" sz="1600" kern="1200"/>
+            <a:rPr lang="en-US" sz="1600" kern="1200" dirty="0"/>
             <a:t>Use Like, IN, and wildcards with Where.</a:t>
           </a:r>
         </a:p>
@@ -2961,7 +2961,7 @@
             <a:buNone/>
           </a:pPr>
           <a:r>
-            <a:rPr lang="en-US" sz="1600" kern="1200"/>
+            <a:rPr lang="en-US" sz="1600" kern="1200" dirty="0"/>
             <a:t>Use data functions with Where.</a:t>
           </a:r>
         </a:p>
@@ -4452,7 +4452,7 @@
           <a:p>
             <a:fld id="{547C4DAB-F4F4-4143-AF09-A2018427EBE3}" type="datetimeFigureOut">
               <a:rPr lang="en-AU" smtClean="0"/>
-              <a:t>18/03/2021</a:t>
+              <a:t>4/06/2021</a:t>
             </a:fld>
             <a:endParaRPr lang="en-AU"/>
           </a:p>
@@ -4652,7 +4652,7 @@
           <a:p>
             <a:fld id="{547C4DAB-F4F4-4143-AF09-A2018427EBE3}" type="datetimeFigureOut">
               <a:rPr lang="en-AU" smtClean="0"/>
-              <a:t>18/03/2021</a:t>
+              <a:t>4/06/2021</a:t>
             </a:fld>
             <a:endParaRPr lang="en-AU"/>
           </a:p>
@@ -4862,7 +4862,7 @@
           <a:p>
             <a:fld id="{547C4DAB-F4F4-4143-AF09-A2018427EBE3}" type="datetimeFigureOut">
               <a:rPr lang="en-AU" smtClean="0"/>
-              <a:t>18/03/2021</a:t>
+              <a:t>4/06/2021</a:t>
             </a:fld>
             <a:endParaRPr lang="en-AU"/>
           </a:p>
@@ -5062,7 +5062,7 @@
           <a:p>
             <a:fld id="{547C4DAB-F4F4-4143-AF09-A2018427EBE3}" type="datetimeFigureOut">
               <a:rPr lang="en-AU" smtClean="0"/>
-              <a:t>18/03/2021</a:t>
+              <a:t>4/06/2021</a:t>
             </a:fld>
             <a:endParaRPr lang="en-AU"/>
           </a:p>
@@ -5338,7 +5338,7 @@
           <a:p>
             <a:fld id="{547C4DAB-F4F4-4143-AF09-A2018427EBE3}" type="datetimeFigureOut">
               <a:rPr lang="en-AU" smtClean="0"/>
-              <a:t>18/03/2021</a:t>
+              <a:t>4/06/2021</a:t>
             </a:fld>
             <a:endParaRPr lang="en-AU"/>
           </a:p>
@@ -5606,7 +5606,7 @@
           <a:p>
             <a:fld id="{547C4DAB-F4F4-4143-AF09-A2018427EBE3}" type="datetimeFigureOut">
               <a:rPr lang="en-AU" smtClean="0"/>
-              <a:t>18/03/2021</a:t>
+              <a:t>4/06/2021</a:t>
             </a:fld>
             <a:endParaRPr lang="en-AU"/>
           </a:p>
@@ -6021,7 +6021,7 @@
           <a:p>
             <a:fld id="{547C4DAB-F4F4-4143-AF09-A2018427EBE3}" type="datetimeFigureOut">
               <a:rPr lang="en-AU" smtClean="0"/>
-              <a:t>18/03/2021</a:t>
+              <a:t>4/06/2021</a:t>
             </a:fld>
             <a:endParaRPr lang="en-AU"/>
           </a:p>
@@ -6163,7 +6163,7 @@
           <a:p>
             <a:fld id="{547C4DAB-F4F4-4143-AF09-A2018427EBE3}" type="datetimeFigureOut">
               <a:rPr lang="en-AU" smtClean="0"/>
-              <a:t>18/03/2021</a:t>
+              <a:t>4/06/2021</a:t>
             </a:fld>
             <a:endParaRPr lang="en-AU"/>
           </a:p>
@@ -6276,7 +6276,7 @@
           <a:p>
             <a:fld id="{547C4DAB-F4F4-4143-AF09-A2018427EBE3}" type="datetimeFigureOut">
               <a:rPr lang="en-AU" smtClean="0"/>
-              <a:t>18/03/2021</a:t>
+              <a:t>4/06/2021</a:t>
             </a:fld>
             <a:endParaRPr lang="en-AU"/>
           </a:p>
@@ -6589,7 +6589,7 @@
           <a:p>
             <a:fld id="{547C4DAB-F4F4-4143-AF09-A2018427EBE3}" type="datetimeFigureOut">
               <a:rPr lang="en-AU" smtClean="0"/>
-              <a:t>18/03/2021</a:t>
+              <a:t>4/06/2021</a:t>
             </a:fld>
             <a:endParaRPr lang="en-AU"/>
           </a:p>
@@ -6878,7 +6878,7 @@
           <a:p>
             <a:fld id="{547C4DAB-F4F4-4143-AF09-A2018427EBE3}" type="datetimeFigureOut">
               <a:rPr lang="en-AU" smtClean="0"/>
-              <a:t>18/03/2021</a:t>
+              <a:t>4/06/2021</a:t>
             </a:fld>
             <a:endParaRPr lang="en-AU"/>
           </a:p>
@@ -7121,7 +7121,7 @@
           <a:p>
             <a:fld id="{547C4DAB-F4F4-4143-AF09-A2018427EBE3}" type="datetimeFigureOut">
               <a:rPr lang="en-AU" smtClean="0"/>
-              <a:t>18/03/2021</a:t>
+              <a:t>4/06/2021</a:t>
             </a:fld>
             <a:endParaRPr lang="en-AU"/>
           </a:p>
@@ -7914,34 +7914,34 @@
           <a:lstStyle/>
           <a:p>
             <a:r>
-              <a:rPr lang="en-US" sz="2000"/>
+              <a:rPr lang="en-US" sz="2000" dirty="0"/>
               <a:t>SQL  stands for Structured Query language.</a:t>
             </a:r>
           </a:p>
           <a:p>
             <a:r>
-              <a:rPr lang="en-US" sz="2000"/>
+              <a:rPr lang="en-US" sz="2000" dirty="0"/>
               <a:t>SQL retrieve data from databases.</a:t>
             </a:r>
           </a:p>
           <a:p>
             <a:r>
-              <a:rPr lang="en-US" sz="2000"/>
+              <a:rPr lang="en-US" sz="2000" dirty="0"/>
               <a:t>SQL is sometimes pronounced as “SEQUEL”.</a:t>
             </a:r>
           </a:p>
           <a:p>
             <a:r>
-              <a:rPr lang="en-US" sz="2000"/>
+              <a:rPr lang="en-US" sz="2000" dirty="0"/>
               <a:t>In this course, “database” means “Relational database”.</a:t>
             </a:r>
           </a:p>
           <a:p>
             <a:r>
-              <a:rPr lang="en-US" sz="2000"/>
+              <a:rPr lang="en-US" sz="2000" dirty="0"/>
               <a:t>Relational databases can be thought of as a spreadsheet, with tables and columns.</a:t>
             </a:r>
-            <a:endParaRPr lang="en-AU" sz="2000"/>
+            <a:endParaRPr lang="en-AU" sz="2000" dirty="0"/>
           </a:p>
         </p:txBody>
       </p:sp>
@@ -8037,6 +8037,614 @@
   <p:clrMapOvr>
     <a:masterClrMapping/>
   </p:clrMapOvr>
+  <p:timing>
+    <p:tnLst>
+      <p:par>
+        <p:cTn id="1" dur="indefinite" restart="never" nodeType="tmRoot">
+          <p:childTnLst>
+            <p:seq concurrent="1" nextAc="seek">
+              <p:cTn id="2" dur="indefinite" nodeType="mainSeq">
+                <p:childTnLst>
+                  <p:par>
+                    <p:cTn id="3" fill="hold">
+                      <p:stCondLst>
+                        <p:cond delay="indefinite"/>
+                      </p:stCondLst>
+                      <p:childTnLst>
+                        <p:par>
+                          <p:cTn id="4" fill="hold">
+                            <p:stCondLst>
+                              <p:cond delay="0"/>
+                            </p:stCondLst>
+                            <p:childTnLst>
+                              <p:par>
+                                <p:cTn id="5" presetID="42" presetClass="entr" presetSubtype="0" fill="hold" grpId="0" nodeType="clickEffect">
+                                  <p:stCondLst>
+                                    <p:cond delay="0"/>
+                                  </p:stCondLst>
+                                  <p:childTnLst>
+                                    <p:set>
+                                      <p:cBhvr>
+                                        <p:cTn id="6" dur="1" fill="hold">
+                                          <p:stCondLst>
+                                            <p:cond delay="0"/>
+                                          </p:stCondLst>
+                                        </p:cTn>
+                                        <p:tgtEl>
+                                          <p:spTgt spid="3">
+                                            <p:txEl>
+                                              <p:pRg st="0" end="0"/>
+                                            </p:txEl>
+                                          </p:spTgt>
+                                        </p:tgtEl>
+                                        <p:attrNameLst>
+                                          <p:attrName>style.visibility</p:attrName>
+                                        </p:attrNameLst>
+                                      </p:cBhvr>
+                                      <p:to>
+                                        <p:strVal val="visible"/>
+                                      </p:to>
+                                    </p:set>
+                                    <p:animEffect transition="in" filter="fade">
+                                      <p:cBhvr>
+                                        <p:cTn id="7" dur="1000"/>
+                                        <p:tgtEl>
+                                          <p:spTgt spid="3">
+                                            <p:txEl>
+                                              <p:pRg st="0" end="0"/>
+                                            </p:txEl>
+                                          </p:spTgt>
+                                        </p:tgtEl>
+                                      </p:cBhvr>
+                                    </p:animEffect>
+                                    <p:anim calcmode="lin" valueType="num">
+                                      <p:cBhvr>
+                                        <p:cTn id="8" dur="1000" fill="hold"/>
+                                        <p:tgtEl>
+                                          <p:spTgt spid="3">
+                                            <p:txEl>
+                                              <p:pRg st="0" end="0"/>
+                                            </p:txEl>
+                                          </p:spTgt>
+                                        </p:tgtEl>
+                                        <p:attrNameLst>
+                                          <p:attrName>ppt_x</p:attrName>
+                                        </p:attrNameLst>
+                                      </p:cBhvr>
+                                      <p:tavLst>
+                                        <p:tav tm="0">
+                                          <p:val>
+                                            <p:strVal val="#ppt_x"/>
+                                          </p:val>
+                                        </p:tav>
+                                        <p:tav tm="100000">
+                                          <p:val>
+                                            <p:strVal val="#ppt_x"/>
+                                          </p:val>
+                                        </p:tav>
+                                      </p:tavLst>
+                                    </p:anim>
+                                    <p:anim calcmode="lin" valueType="num">
+                                      <p:cBhvr>
+                                        <p:cTn id="9" dur="1000" fill="hold"/>
+                                        <p:tgtEl>
+                                          <p:spTgt spid="3">
+                                            <p:txEl>
+                                              <p:pRg st="0" end="0"/>
+                                            </p:txEl>
+                                          </p:spTgt>
+                                        </p:tgtEl>
+                                        <p:attrNameLst>
+                                          <p:attrName>ppt_y</p:attrName>
+                                        </p:attrNameLst>
+                                      </p:cBhvr>
+                                      <p:tavLst>
+                                        <p:tav tm="0">
+                                          <p:val>
+                                            <p:strVal val="#ppt_y+.1"/>
+                                          </p:val>
+                                        </p:tav>
+                                        <p:tav tm="100000">
+                                          <p:val>
+                                            <p:strVal val="#ppt_y"/>
+                                          </p:val>
+                                        </p:tav>
+                                      </p:tavLst>
+                                    </p:anim>
+                                  </p:childTnLst>
+                                </p:cTn>
+                              </p:par>
+                            </p:childTnLst>
+                          </p:cTn>
+                        </p:par>
+                      </p:childTnLst>
+                    </p:cTn>
+                  </p:par>
+                  <p:par>
+                    <p:cTn id="10" fill="hold">
+                      <p:stCondLst>
+                        <p:cond delay="indefinite"/>
+                      </p:stCondLst>
+                      <p:childTnLst>
+                        <p:par>
+                          <p:cTn id="11" fill="hold">
+                            <p:stCondLst>
+                              <p:cond delay="0"/>
+                            </p:stCondLst>
+                            <p:childTnLst>
+                              <p:par>
+                                <p:cTn id="12" presetID="42" presetClass="entr" presetSubtype="0" fill="hold" grpId="0" nodeType="clickEffect">
+                                  <p:stCondLst>
+                                    <p:cond delay="0"/>
+                                  </p:stCondLst>
+                                  <p:childTnLst>
+                                    <p:set>
+                                      <p:cBhvr>
+                                        <p:cTn id="13" dur="1" fill="hold">
+                                          <p:stCondLst>
+                                            <p:cond delay="0"/>
+                                          </p:stCondLst>
+                                        </p:cTn>
+                                        <p:tgtEl>
+                                          <p:spTgt spid="3">
+                                            <p:txEl>
+                                              <p:pRg st="1" end="1"/>
+                                            </p:txEl>
+                                          </p:spTgt>
+                                        </p:tgtEl>
+                                        <p:attrNameLst>
+                                          <p:attrName>style.visibility</p:attrName>
+                                        </p:attrNameLst>
+                                      </p:cBhvr>
+                                      <p:to>
+                                        <p:strVal val="visible"/>
+                                      </p:to>
+                                    </p:set>
+                                    <p:animEffect transition="in" filter="fade">
+                                      <p:cBhvr>
+                                        <p:cTn id="14" dur="1000"/>
+                                        <p:tgtEl>
+                                          <p:spTgt spid="3">
+                                            <p:txEl>
+                                              <p:pRg st="1" end="1"/>
+                                            </p:txEl>
+                                          </p:spTgt>
+                                        </p:tgtEl>
+                                      </p:cBhvr>
+                                    </p:animEffect>
+                                    <p:anim calcmode="lin" valueType="num">
+                                      <p:cBhvr>
+                                        <p:cTn id="15" dur="1000" fill="hold"/>
+                                        <p:tgtEl>
+                                          <p:spTgt spid="3">
+                                            <p:txEl>
+                                              <p:pRg st="1" end="1"/>
+                                            </p:txEl>
+                                          </p:spTgt>
+                                        </p:tgtEl>
+                                        <p:attrNameLst>
+                                          <p:attrName>ppt_x</p:attrName>
+                                        </p:attrNameLst>
+                                      </p:cBhvr>
+                                      <p:tavLst>
+                                        <p:tav tm="0">
+                                          <p:val>
+                                            <p:strVal val="#ppt_x"/>
+                                          </p:val>
+                                        </p:tav>
+                                        <p:tav tm="100000">
+                                          <p:val>
+                                            <p:strVal val="#ppt_x"/>
+                                          </p:val>
+                                        </p:tav>
+                                      </p:tavLst>
+                                    </p:anim>
+                                    <p:anim calcmode="lin" valueType="num">
+                                      <p:cBhvr>
+                                        <p:cTn id="16" dur="1000" fill="hold"/>
+                                        <p:tgtEl>
+                                          <p:spTgt spid="3">
+                                            <p:txEl>
+                                              <p:pRg st="1" end="1"/>
+                                            </p:txEl>
+                                          </p:spTgt>
+                                        </p:tgtEl>
+                                        <p:attrNameLst>
+                                          <p:attrName>ppt_y</p:attrName>
+                                        </p:attrNameLst>
+                                      </p:cBhvr>
+                                      <p:tavLst>
+                                        <p:tav tm="0">
+                                          <p:val>
+                                            <p:strVal val="#ppt_y+.1"/>
+                                          </p:val>
+                                        </p:tav>
+                                        <p:tav tm="100000">
+                                          <p:val>
+                                            <p:strVal val="#ppt_y"/>
+                                          </p:val>
+                                        </p:tav>
+                                      </p:tavLst>
+                                    </p:anim>
+                                  </p:childTnLst>
+                                </p:cTn>
+                              </p:par>
+                            </p:childTnLst>
+                          </p:cTn>
+                        </p:par>
+                      </p:childTnLst>
+                    </p:cTn>
+                  </p:par>
+                  <p:par>
+                    <p:cTn id="17" fill="hold">
+                      <p:stCondLst>
+                        <p:cond delay="indefinite"/>
+                      </p:stCondLst>
+                      <p:childTnLst>
+                        <p:par>
+                          <p:cTn id="18" fill="hold">
+                            <p:stCondLst>
+                              <p:cond delay="0"/>
+                            </p:stCondLst>
+                            <p:childTnLst>
+                              <p:par>
+                                <p:cTn id="19" presetID="42" presetClass="entr" presetSubtype="0" fill="hold" grpId="0" nodeType="clickEffect">
+                                  <p:stCondLst>
+                                    <p:cond delay="0"/>
+                                  </p:stCondLst>
+                                  <p:childTnLst>
+                                    <p:set>
+                                      <p:cBhvr>
+                                        <p:cTn id="20" dur="1" fill="hold">
+                                          <p:stCondLst>
+                                            <p:cond delay="0"/>
+                                          </p:stCondLst>
+                                        </p:cTn>
+                                        <p:tgtEl>
+                                          <p:spTgt spid="3">
+                                            <p:txEl>
+                                              <p:pRg st="2" end="2"/>
+                                            </p:txEl>
+                                          </p:spTgt>
+                                        </p:tgtEl>
+                                        <p:attrNameLst>
+                                          <p:attrName>style.visibility</p:attrName>
+                                        </p:attrNameLst>
+                                      </p:cBhvr>
+                                      <p:to>
+                                        <p:strVal val="visible"/>
+                                      </p:to>
+                                    </p:set>
+                                    <p:animEffect transition="in" filter="fade">
+                                      <p:cBhvr>
+                                        <p:cTn id="21" dur="1000"/>
+                                        <p:tgtEl>
+                                          <p:spTgt spid="3">
+                                            <p:txEl>
+                                              <p:pRg st="2" end="2"/>
+                                            </p:txEl>
+                                          </p:spTgt>
+                                        </p:tgtEl>
+                                      </p:cBhvr>
+                                    </p:animEffect>
+                                    <p:anim calcmode="lin" valueType="num">
+                                      <p:cBhvr>
+                                        <p:cTn id="22" dur="1000" fill="hold"/>
+                                        <p:tgtEl>
+                                          <p:spTgt spid="3">
+                                            <p:txEl>
+                                              <p:pRg st="2" end="2"/>
+                                            </p:txEl>
+                                          </p:spTgt>
+                                        </p:tgtEl>
+                                        <p:attrNameLst>
+                                          <p:attrName>ppt_x</p:attrName>
+                                        </p:attrNameLst>
+                                      </p:cBhvr>
+                                      <p:tavLst>
+                                        <p:tav tm="0">
+                                          <p:val>
+                                            <p:strVal val="#ppt_x"/>
+                                          </p:val>
+                                        </p:tav>
+                                        <p:tav tm="100000">
+                                          <p:val>
+                                            <p:strVal val="#ppt_x"/>
+                                          </p:val>
+                                        </p:tav>
+                                      </p:tavLst>
+                                    </p:anim>
+                                    <p:anim calcmode="lin" valueType="num">
+                                      <p:cBhvr>
+                                        <p:cTn id="23" dur="1000" fill="hold"/>
+                                        <p:tgtEl>
+                                          <p:spTgt spid="3">
+                                            <p:txEl>
+                                              <p:pRg st="2" end="2"/>
+                                            </p:txEl>
+                                          </p:spTgt>
+                                        </p:tgtEl>
+                                        <p:attrNameLst>
+                                          <p:attrName>ppt_y</p:attrName>
+                                        </p:attrNameLst>
+                                      </p:cBhvr>
+                                      <p:tavLst>
+                                        <p:tav tm="0">
+                                          <p:val>
+                                            <p:strVal val="#ppt_y+.1"/>
+                                          </p:val>
+                                        </p:tav>
+                                        <p:tav tm="100000">
+                                          <p:val>
+                                            <p:strVal val="#ppt_y"/>
+                                          </p:val>
+                                        </p:tav>
+                                      </p:tavLst>
+                                    </p:anim>
+                                  </p:childTnLst>
+                                </p:cTn>
+                              </p:par>
+                            </p:childTnLst>
+                          </p:cTn>
+                        </p:par>
+                      </p:childTnLst>
+                    </p:cTn>
+                  </p:par>
+                  <p:par>
+                    <p:cTn id="24" fill="hold">
+                      <p:stCondLst>
+                        <p:cond delay="indefinite"/>
+                      </p:stCondLst>
+                      <p:childTnLst>
+                        <p:par>
+                          <p:cTn id="25" fill="hold">
+                            <p:stCondLst>
+                              <p:cond delay="0"/>
+                            </p:stCondLst>
+                            <p:childTnLst>
+                              <p:par>
+                                <p:cTn id="26" presetID="42" presetClass="entr" presetSubtype="0" fill="hold" grpId="0" nodeType="clickEffect">
+                                  <p:stCondLst>
+                                    <p:cond delay="0"/>
+                                  </p:stCondLst>
+                                  <p:childTnLst>
+                                    <p:set>
+                                      <p:cBhvr>
+                                        <p:cTn id="27" dur="1" fill="hold">
+                                          <p:stCondLst>
+                                            <p:cond delay="0"/>
+                                          </p:stCondLst>
+                                        </p:cTn>
+                                        <p:tgtEl>
+                                          <p:spTgt spid="3">
+                                            <p:txEl>
+                                              <p:pRg st="3" end="3"/>
+                                            </p:txEl>
+                                          </p:spTgt>
+                                        </p:tgtEl>
+                                        <p:attrNameLst>
+                                          <p:attrName>style.visibility</p:attrName>
+                                        </p:attrNameLst>
+                                      </p:cBhvr>
+                                      <p:to>
+                                        <p:strVal val="visible"/>
+                                      </p:to>
+                                    </p:set>
+                                    <p:animEffect transition="in" filter="fade">
+                                      <p:cBhvr>
+                                        <p:cTn id="28" dur="1000"/>
+                                        <p:tgtEl>
+                                          <p:spTgt spid="3">
+                                            <p:txEl>
+                                              <p:pRg st="3" end="3"/>
+                                            </p:txEl>
+                                          </p:spTgt>
+                                        </p:tgtEl>
+                                      </p:cBhvr>
+                                    </p:animEffect>
+                                    <p:anim calcmode="lin" valueType="num">
+                                      <p:cBhvr>
+                                        <p:cTn id="29" dur="1000" fill="hold"/>
+                                        <p:tgtEl>
+                                          <p:spTgt spid="3">
+                                            <p:txEl>
+                                              <p:pRg st="3" end="3"/>
+                                            </p:txEl>
+                                          </p:spTgt>
+                                        </p:tgtEl>
+                                        <p:attrNameLst>
+                                          <p:attrName>ppt_x</p:attrName>
+                                        </p:attrNameLst>
+                                      </p:cBhvr>
+                                      <p:tavLst>
+                                        <p:tav tm="0">
+                                          <p:val>
+                                            <p:strVal val="#ppt_x"/>
+                                          </p:val>
+                                        </p:tav>
+                                        <p:tav tm="100000">
+                                          <p:val>
+                                            <p:strVal val="#ppt_x"/>
+                                          </p:val>
+                                        </p:tav>
+                                      </p:tavLst>
+                                    </p:anim>
+                                    <p:anim calcmode="lin" valueType="num">
+                                      <p:cBhvr>
+                                        <p:cTn id="30" dur="1000" fill="hold"/>
+                                        <p:tgtEl>
+                                          <p:spTgt spid="3">
+                                            <p:txEl>
+                                              <p:pRg st="3" end="3"/>
+                                            </p:txEl>
+                                          </p:spTgt>
+                                        </p:tgtEl>
+                                        <p:attrNameLst>
+                                          <p:attrName>ppt_y</p:attrName>
+                                        </p:attrNameLst>
+                                      </p:cBhvr>
+                                      <p:tavLst>
+                                        <p:tav tm="0">
+                                          <p:val>
+                                            <p:strVal val="#ppt_y+.1"/>
+                                          </p:val>
+                                        </p:tav>
+                                        <p:tav tm="100000">
+                                          <p:val>
+                                            <p:strVal val="#ppt_y"/>
+                                          </p:val>
+                                        </p:tav>
+                                      </p:tavLst>
+                                    </p:anim>
+                                  </p:childTnLst>
+                                </p:cTn>
+                              </p:par>
+                            </p:childTnLst>
+                          </p:cTn>
+                        </p:par>
+                      </p:childTnLst>
+                    </p:cTn>
+                  </p:par>
+                  <p:par>
+                    <p:cTn id="31" fill="hold">
+                      <p:stCondLst>
+                        <p:cond delay="indefinite"/>
+                      </p:stCondLst>
+                      <p:childTnLst>
+                        <p:par>
+                          <p:cTn id="32" fill="hold">
+                            <p:stCondLst>
+                              <p:cond delay="0"/>
+                            </p:stCondLst>
+                            <p:childTnLst>
+                              <p:par>
+                                <p:cTn id="33" presetID="42" presetClass="entr" presetSubtype="0" fill="hold" grpId="0" nodeType="clickEffect">
+                                  <p:stCondLst>
+                                    <p:cond delay="0"/>
+                                  </p:stCondLst>
+                                  <p:childTnLst>
+                                    <p:set>
+                                      <p:cBhvr>
+                                        <p:cTn id="34" dur="1" fill="hold">
+                                          <p:stCondLst>
+                                            <p:cond delay="0"/>
+                                          </p:stCondLst>
+                                        </p:cTn>
+                                        <p:tgtEl>
+                                          <p:spTgt spid="3">
+                                            <p:txEl>
+                                              <p:pRg st="4" end="4"/>
+                                            </p:txEl>
+                                          </p:spTgt>
+                                        </p:tgtEl>
+                                        <p:attrNameLst>
+                                          <p:attrName>style.visibility</p:attrName>
+                                        </p:attrNameLst>
+                                      </p:cBhvr>
+                                      <p:to>
+                                        <p:strVal val="visible"/>
+                                      </p:to>
+                                    </p:set>
+                                    <p:animEffect transition="in" filter="fade">
+                                      <p:cBhvr>
+                                        <p:cTn id="35" dur="1000"/>
+                                        <p:tgtEl>
+                                          <p:spTgt spid="3">
+                                            <p:txEl>
+                                              <p:pRg st="4" end="4"/>
+                                            </p:txEl>
+                                          </p:spTgt>
+                                        </p:tgtEl>
+                                      </p:cBhvr>
+                                    </p:animEffect>
+                                    <p:anim calcmode="lin" valueType="num">
+                                      <p:cBhvr>
+                                        <p:cTn id="36" dur="1000" fill="hold"/>
+                                        <p:tgtEl>
+                                          <p:spTgt spid="3">
+                                            <p:txEl>
+                                              <p:pRg st="4" end="4"/>
+                                            </p:txEl>
+                                          </p:spTgt>
+                                        </p:tgtEl>
+                                        <p:attrNameLst>
+                                          <p:attrName>ppt_x</p:attrName>
+                                        </p:attrNameLst>
+                                      </p:cBhvr>
+                                      <p:tavLst>
+                                        <p:tav tm="0">
+                                          <p:val>
+                                            <p:strVal val="#ppt_x"/>
+                                          </p:val>
+                                        </p:tav>
+                                        <p:tav tm="100000">
+                                          <p:val>
+                                            <p:strVal val="#ppt_x"/>
+                                          </p:val>
+                                        </p:tav>
+                                      </p:tavLst>
+                                    </p:anim>
+                                    <p:anim calcmode="lin" valueType="num">
+                                      <p:cBhvr>
+                                        <p:cTn id="37" dur="1000" fill="hold"/>
+                                        <p:tgtEl>
+                                          <p:spTgt spid="3">
+                                            <p:txEl>
+                                              <p:pRg st="4" end="4"/>
+                                            </p:txEl>
+                                          </p:spTgt>
+                                        </p:tgtEl>
+                                        <p:attrNameLst>
+                                          <p:attrName>ppt_y</p:attrName>
+                                        </p:attrNameLst>
+                                      </p:cBhvr>
+                                      <p:tavLst>
+                                        <p:tav tm="0">
+                                          <p:val>
+                                            <p:strVal val="#ppt_y+.1"/>
+                                          </p:val>
+                                        </p:tav>
+                                        <p:tav tm="100000">
+                                          <p:val>
+                                            <p:strVal val="#ppt_y"/>
+                                          </p:val>
+                                        </p:tav>
+                                      </p:tavLst>
+                                    </p:anim>
+                                  </p:childTnLst>
+                                </p:cTn>
+                              </p:par>
+                            </p:childTnLst>
+                          </p:cTn>
+                        </p:par>
+                      </p:childTnLst>
+                    </p:cTn>
+                  </p:par>
+                </p:childTnLst>
+              </p:cTn>
+              <p:prevCondLst>
+                <p:cond evt="onPrev" delay="0">
+                  <p:tgtEl>
+                    <p:sldTgt/>
+                  </p:tgtEl>
+                </p:cond>
+              </p:prevCondLst>
+              <p:nextCondLst>
+                <p:cond evt="onNext" delay="0">
+                  <p:tgtEl>
+                    <p:sldTgt/>
+                  </p:tgtEl>
+                </p:cond>
+              </p:nextCondLst>
+            </p:seq>
+          </p:childTnLst>
+        </p:cTn>
+      </p:par>
+    </p:tnLst>
+    <p:bldLst>
+      <p:bldP spid="3" grpId="0" build="p"/>
+    </p:bldLst>
+  </p:timing>
 </p:sld>
 </file>
 
@@ -8606,7 +9214,7 @@
             <p:ph idx="1"/>
             <p:extLst>
               <p:ext uri="{D42A27DB-BD31-4B8C-83A1-F6EECF244321}">
-                <p14:modId xmlns:p14="http://schemas.microsoft.com/office/powerpoint/2010/main" val="205843084"/>
+                <p14:modId xmlns:p14="http://schemas.microsoft.com/office/powerpoint/2010/main" val="3873656941"/>
               </p:ext>
             </p:extLst>
           </p:nvPr>

</xml_diff>